<commit_message>
fixed the issues with my presentation
</commit_message>
<xml_diff>
--- a/docs/wiki/TRM_Project_Presentation.pptx
+++ b/docs/wiki/TRM_Project_Presentation.pptx
@@ -138,12 +138,20 @@
 </p:presentation>
 </file>
 
+<file path=ppt/revisionInfo.xml><?xml version="1.0" encoding="utf-8"?>
+<p1510:revInfo xmlns:a="http://schemas.openxmlformats.org/drawingml/2006/main" xmlns:r="http://schemas.openxmlformats.org/officeDocument/2006/relationships" xmlns:p1510="http://schemas.microsoft.com/office/powerpoint/2015/10/main">
+  <p1510:revLst>
+    <p1510:client id="{6BC12A0F-FEB2-40A6-B544-4C67A80A2744}" v="2" dt="2025-07-18T16:21:10.769"/>
+  </p1510:revLst>
+</p1510:revInfo>
+</file>
+
 <file path=ppt/changesInfos/changesInfo1.xml><?xml version="1.0" encoding="utf-8"?>
 <pc:chgInfo xmlns:a="http://schemas.openxmlformats.org/drawingml/2006/main" xmlns:r="http://schemas.openxmlformats.org/officeDocument/2006/relationships" xmlns:ac="http://schemas.microsoft.com/office/drawing/2013/main/command" xmlns:pc="http://schemas.microsoft.com/office/powerpoint/2013/main/command">
   <pc:docChgLst>
     <pc:chgData name="Abraham, Naod [US]" userId="fd4cf453-15d9-4180-925f-6c6e73737e62" providerId="ADAL" clId="{6BC12A0F-FEB2-40A6-B544-4C67A80A2744}"/>
     <pc:docChg chg="custSel modSld">
-      <pc:chgData name="Abraham, Naod [US]" userId="fd4cf453-15d9-4180-925f-6c6e73737e62" providerId="ADAL" clId="{6BC12A0F-FEB2-40A6-B544-4C67A80A2744}" dt="2025-07-18T16:20:47.313" v="1" actId="478"/>
+      <pc:chgData name="Abraham, Naod [US]" userId="fd4cf453-15d9-4180-925f-6c6e73737e62" providerId="ADAL" clId="{6BC12A0F-FEB2-40A6-B544-4C67A80A2744}" dt="2025-07-18T17:53:00.081" v="43" actId="20577"/>
       <pc:docMkLst>
         <pc:docMk/>
       </pc:docMkLst>
@@ -162,12 +170,44 @@
           </ac:spMkLst>
         </pc:spChg>
       </pc:sldChg>
-      <pc:sldChg chg="delSp mod">
-        <pc:chgData name="Abraham, Naod [US]" userId="fd4cf453-15d9-4180-925f-6c6e73737e62" providerId="ADAL" clId="{6BC12A0F-FEB2-40A6-B544-4C67A80A2744}" dt="2025-07-18T16:20:47.313" v="1" actId="478"/>
+      <pc:sldChg chg="addSp delSp modSp mod">
+        <pc:chgData name="Abraham, Naod [US]" userId="fd4cf453-15d9-4180-925f-6c6e73737e62" providerId="ADAL" clId="{6BC12A0F-FEB2-40A6-B544-4C67A80A2744}" dt="2025-07-18T17:52:23.672" v="40" actId="313"/>
         <pc:sldMkLst>
           <pc:docMk/>
           <pc:sldMk cId="0" sldId="259"/>
         </pc:sldMkLst>
+        <pc:spChg chg="add mod">
+          <ac:chgData name="Abraham, Naod [US]" userId="fd4cf453-15d9-4180-925f-6c6e73737e62" providerId="ADAL" clId="{6BC12A0F-FEB2-40A6-B544-4C67A80A2744}" dt="2025-07-18T16:21:03.557" v="2"/>
+          <ac:spMkLst>
+            <pc:docMk/>
+            <pc:sldMk cId="0" sldId="259"/>
+            <ac:spMk id="2" creationId="{085E8B34-39C3-8C4B-45AD-AD0E1312C9EE}"/>
+          </ac:spMkLst>
+        </pc:spChg>
+        <pc:spChg chg="add mod ord">
+          <ac:chgData name="Abraham, Naod [US]" userId="fd4cf453-15d9-4180-925f-6c6e73737e62" providerId="ADAL" clId="{6BC12A0F-FEB2-40A6-B544-4C67A80A2744}" dt="2025-07-18T16:21:15.870" v="4" actId="167"/>
+          <ac:spMkLst>
+            <pc:docMk/>
+            <pc:sldMk cId="0" sldId="259"/>
+            <ac:spMk id="3" creationId="{DBCBA665-3C52-A718-5873-156DF475AB8A}"/>
+          </ac:spMkLst>
+        </pc:spChg>
+        <pc:spChg chg="mod">
+          <ac:chgData name="Abraham, Naod [US]" userId="fd4cf453-15d9-4180-925f-6c6e73737e62" providerId="ADAL" clId="{6BC12A0F-FEB2-40A6-B544-4C67A80A2744}" dt="2025-07-18T17:51:16.424" v="6" actId="20577"/>
+          <ac:spMkLst>
+            <pc:docMk/>
+            <pc:sldMk cId="0" sldId="259"/>
+            <ac:spMk id="37" creationId="{962EC11E-D211-4B5E-B5AD-DEFD04F77EB8}"/>
+          </ac:spMkLst>
+        </pc:spChg>
+        <pc:spChg chg="mod">
+          <ac:chgData name="Abraham, Naod [US]" userId="fd4cf453-15d9-4180-925f-6c6e73737e62" providerId="ADAL" clId="{6BC12A0F-FEB2-40A6-B544-4C67A80A2744}" dt="2025-07-18T17:52:23.672" v="40" actId="313"/>
+          <ac:spMkLst>
+            <pc:docMk/>
+            <pc:sldMk cId="0" sldId="259"/>
+            <ac:spMk id="38" creationId="{DED32D52-7463-2520-10A0-407846A3ECC1}"/>
+          </ac:spMkLst>
+        </pc:spChg>
         <pc:picChg chg="del">
           <ac:chgData name="Abraham, Naod [US]" userId="fd4cf453-15d9-4180-925f-6c6e73737e62" providerId="ADAL" clId="{6BC12A0F-FEB2-40A6-B544-4C67A80A2744}" dt="2025-07-18T16:20:47.313" v="1" actId="478"/>
           <ac:picMkLst>
@@ -176,6 +216,29 @@
             <ac:picMk id="36" creationId="{02474419-9239-D7C2-1998-70990246A6CB}"/>
           </ac:picMkLst>
         </pc:picChg>
+      </pc:sldChg>
+      <pc:sldChg chg="modSp mod">
+        <pc:chgData name="Abraham, Naod [US]" userId="fd4cf453-15d9-4180-925f-6c6e73737e62" providerId="ADAL" clId="{6BC12A0F-FEB2-40A6-B544-4C67A80A2744}" dt="2025-07-18T17:53:00.081" v="43" actId="20577"/>
+        <pc:sldMkLst>
+          <pc:docMk/>
+          <pc:sldMk cId="0" sldId="264"/>
+        </pc:sldMkLst>
+        <pc:spChg chg="mod">
+          <ac:chgData name="Abraham, Naod [US]" userId="fd4cf453-15d9-4180-925f-6c6e73737e62" providerId="ADAL" clId="{6BC12A0F-FEB2-40A6-B544-4C67A80A2744}" dt="2025-07-18T17:52:38.813" v="41" actId="20577"/>
+          <ac:spMkLst>
+            <pc:docMk/>
+            <pc:sldMk cId="0" sldId="264"/>
+            <ac:spMk id="19" creationId="{00000000-0000-0000-0000-000000000000}"/>
+          </ac:spMkLst>
+        </pc:spChg>
+        <pc:spChg chg="mod">
+          <ac:chgData name="Abraham, Naod [US]" userId="fd4cf453-15d9-4180-925f-6c6e73737e62" providerId="ADAL" clId="{6BC12A0F-FEB2-40A6-B544-4C67A80A2744}" dt="2025-07-18T17:53:00.081" v="43" actId="20577"/>
+          <ac:spMkLst>
+            <pc:docMk/>
+            <pc:sldMk cId="0" sldId="264"/>
+            <ac:spMk id="20" creationId="{FBBEDFA3-AAD2-4299-F52A-AE5878C7DB1D}"/>
+          </ac:spMkLst>
+        </pc:spChg>
       </pc:sldChg>
     </pc:docChg>
   </pc:docChgLst>
@@ -4576,6 +4639,65 @@
           <a:chExt cx="0" cy="0"/>
         </a:xfrm>
       </p:grpSpPr>
+      <p:sp>
+        <p:nvSpPr>
+          <p:cNvPr id="3" name="Freeform 2">
+            <a:extLst>
+              <a:ext uri="{FF2B5EF4-FFF2-40B4-BE49-F238E27FC236}">
+                <a16:creationId xmlns:a16="http://schemas.microsoft.com/office/drawing/2014/main" id="{DBCBA665-3C52-A718-5873-156DF475AB8A}"/>
+              </a:ext>
+            </a:extLst>
+          </p:cNvPr>
+          <p:cNvSpPr/>
+          <p:nvPr/>
+        </p:nvSpPr>
+        <p:spPr>
+          <a:xfrm rot="-5400000" flipV="1">
+            <a:off x="15177010" y="-1253949"/>
+            <a:ext cx="2720897" cy="5228794"/>
+          </a:xfrm>
+          <a:custGeom>
+            <a:avLst/>
+            <a:gdLst/>
+            <a:ahLst/>
+            <a:cxnLst/>
+            <a:rect l="l" t="t" r="r" b="b"/>
+            <a:pathLst>
+              <a:path w="2720897" h="5228794">
+                <a:moveTo>
+                  <a:pt x="0" y="5228795"/>
+                </a:moveTo>
+                <a:lnTo>
+                  <a:pt x="2720897" y="5228795"/>
+                </a:lnTo>
+                <a:lnTo>
+                  <a:pt x="2720897" y="0"/>
+                </a:lnTo>
+                <a:lnTo>
+                  <a:pt x="0" y="0"/>
+                </a:lnTo>
+                <a:lnTo>
+                  <a:pt x="0" y="5228795"/>
+                </a:lnTo>
+                <a:close/>
+              </a:path>
+            </a:pathLst>
+          </a:custGeom>
+          <a:blipFill>
+            <a:blip r:embed="rId2"/>
+            <a:stretch>
+              <a:fillRect/>
+            </a:stretch>
+          </a:blipFill>
+        </p:spPr>
+        <p:txBody>
+          <a:bodyPr/>
+          <a:lstStyle/>
+          <a:p>
+            <a:endParaRPr lang="en-US"/>
+          </a:p>
+        </p:txBody>
+      </p:sp>
       <p:grpSp>
         <p:nvGrpSpPr>
           <p:cNvPr id="4" name="Group 4"/>
@@ -5216,11 +5338,11 @@
           <p:nvPr/>
         </p:nvPicPr>
         <p:blipFill>
-          <a:blip r:embed="rId2">
+          <a:blip r:embed="rId3">
             <a:extLst>
               <a:ext uri="{BEBA8EAE-BF5A-486C-A8C5-ECC9F3942E4B}">
                 <a14:imgProps xmlns:a14="http://schemas.microsoft.com/office/drawing/2010/main">
-                  <a14:imgLayer r:embed="rId3">
+                  <a14:imgLayer r:embed="rId4">
                     <a14:imgEffect>
                       <a14:backgroundRemoval t="3556" b="98667" l="9778" r="89778">
                         <a14:foregroundMark x1="42222" y1="5778" x2="42222" y2="5778"/>
@@ -5284,11 +5406,11 @@
           <p:nvPr/>
         </p:nvPicPr>
         <p:blipFill>
-          <a:blip r:embed="rId4" cstate="print">
+          <a:blip r:embed="rId5" cstate="print">
             <a:extLst>
               <a:ext uri="{BEBA8EAE-BF5A-486C-A8C5-ECC9F3942E4B}">
                 <a14:imgProps xmlns:a14="http://schemas.microsoft.com/office/drawing/2010/main">
-                  <a14:imgLayer r:embed="rId5">
+                  <a14:imgLayer r:embed="rId6">
                     <a14:imgEffect>
                       <a14:backgroundRemoval t="499" b="89831" l="10000" r="98958">
                         <a14:foregroundMark x1="61563" y1="40678" x2="61563" y2="40678"/>
@@ -5377,7 +5499,7 @@
                 <a:cs typeface="Arimo"/>
                 <a:sym typeface="Arimo"/>
               </a:rPr>
-              <a:t>Using Selenium WebDriver, the tool navigates each entry’s TRM webpage and scraps the compliance status directly from the site. Ensuring up-to-date and accurate results.</a:t>
+              <a:t>Using Selenium WebDriver, the tool navigates each entry’s TRM webpage and scrapes the compliance status directly from the site. Ensuring up-to-date and accurate results.</a:t>
             </a:r>
           </a:p>
         </p:txBody>
@@ -5397,14 +5519,14 @@
         <p:spPr>
           <a:xfrm>
             <a:off x="12795938" y="7261049"/>
-            <a:ext cx="4953302" cy="1923604"/>
+            <a:ext cx="5034862" cy="1923604"/>
           </a:xfrm>
           <a:prstGeom prst="rect">
             <a:avLst/>
           </a:prstGeom>
         </p:spPr>
         <p:txBody>
-          <a:bodyPr lIns="0" tIns="0" rIns="0" bIns="0" rtlCol="0" anchor="t">
+          <a:bodyPr wrap="square" lIns="0" tIns="0" rIns="0" bIns="0" rtlCol="0" anchor="t">
             <a:spAutoFit/>
           </a:bodyPr>
           <a:lstStyle/>
@@ -5427,7 +5549,7 @@
                 <a:cs typeface="Arimo"/>
                 <a:sym typeface="Arimo"/>
               </a:rPr>
-              <a:t>My biggest achievement was completing this project a week before the program ended, even though I started late. This reflects my commitment and ability to quickly and efficient deliver results</a:t>
+              <a:t>My biggest achievement was completing this project a week before the program ended, even though I started late. This reflects my commitment and ability to efficiently deliver results</a:t>
             </a:r>
           </a:p>
         </p:txBody>
@@ -5447,11 +5569,11 @@
           <p:nvPr/>
         </p:nvPicPr>
         <p:blipFill>
-          <a:blip r:embed="rId6">
+          <a:blip r:embed="rId7">
             <a:extLst>
               <a:ext uri="{BEBA8EAE-BF5A-486C-A8C5-ECC9F3942E4B}">
                 <a14:imgProps xmlns:a14="http://schemas.microsoft.com/office/drawing/2010/main">
-                  <a14:imgLayer r:embed="rId7">
+                  <a14:imgLayer r:embed="rId8">
                     <a14:imgEffect>
                       <a14:backgroundRemoval t="7910" b="89844" l="9961" r="89844">
                         <a14:foregroundMark x1="16992" y1="13184" x2="16992" y2="13184"/>
@@ -5624,6 +5746,65 @@
               <a:t>Early Completion</a:t>
             </a:r>
             <a:endParaRPr lang="en-US" dirty="0"/>
+          </a:p>
+        </p:txBody>
+      </p:sp>
+      <p:sp>
+        <p:nvSpPr>
+          <p:cNvPr id="2" name="Freeform 4">
+            <a:extLst>
+              <a:ext uri="{FF2B5EF4-FFF2-40B4-BE49-F238E27FC236}">
+                <a16:creationId xmlns:a16="http://schemas.microsoft.com/office/drawing/2014/main" id="{085E8B34-39C3-8C4B-45AD-AD0E1312C9EE}"/>
+              </a:ext>
+            </a:extLst>
+          </p:cNvPr>
+          <p:cNvSpPr/>
+          <p:nvPr/>
+        </p:nvSpPr>
+        <p:spPr>
+          <a:xfrm rot="-5400000">
+            <a:off x="390093" y="-1471468"/>
+            <a:ext cx="2720897" cy="5228794"/>
+          </a:xfrm>
+          <a:custGeom>
+            <a:avLst/>
+            <a:gdLst/>
+            <a:ahLst/>
+            <a:cxnLst/>
+            <a:rect l="l" t="t" r="r" b="b"/>
+            <a:pathLst>
+              <a:path w="2720897" h="5228794">
+                <a:moveTo>
+                  <a:pt x="0" y="0"/>
+                </a:moveTo>
+                <a:lnTo>
+                  <a:pt x="2720897" y="0"/>
+                </a:lnTo>
+                <a:lnTo>
+                  <a:pt x="2720897" y="5228794"/>
+                </a:lnTo>
+                <a:lnTo>
+                  <a:pt x="0" y="5228794"/>
+                </a:lnTo>
+                <a:lnTo>
+                  <a:pt x="0" y="0"/>
+                </a:lnTo>
+                <a:close/>
+              </a:path>
+            </a:pathLst>
+          </a:custGeom>
+          <a:blipFill>
+            <a:blip r:embed="rId2"/>
+            <a:stretch>
+              <a:fillRect/>
+            </a:stretch>
+          </a:blipFill>
+        </p:spPr>
+        <p:txBody>
+          <a:bodyPr/>
+          <a:lstStyle/>
+          <a:p>
+            <a:endParaRPr lang="en-US"/>
           </a:p>
         </p:txBody>
       </p:sp>
@@ -6298,7 +6479,7 @@
                 <a:cs typeface="Arimo"/>
                 <a:sym typeface="Arimo"/>
               </a:rPr>
-              <a:t>One of the biggest personal challenges was commuting to the office regularly. While I wanted to connect and network more in person. The long drive made it difficult to attend as much as I hoped. To stay engaged, I made and effort to connect remotely. </a:t>
+              <a:t>One of the biggest personal challenges was commuting to the office regularly. While I wanted to connect and network more in person. The long drive made it difficult to attend as much as I hoped. To stay engaged, I made an effort to connect remotely. </a:t>
             </a:r>
           </a:p>
         </p:txBody>
@@ -6348,7 +6529,7 @@
                 <a:cs typeface="Arimo"/>
                 <a:sym typeface="Arimo"/>
               </a:rPr>
-              <a:t>Although I came into this project with experience in Python and HTML. I encountered new challenges that pushed me to expand my skills. Debugging issues and optimizing my code led me to discover new libraries., methods, and practices I hadn’t used before.</a:t>
+              <a:t>Although I came into this project with experience in Python and HTML, I encountered new challenges that pushed me to expand my skills. Debugging issues and optimizing my code led me to discover new libraries, methods, and practices I hadn’t used before.</a:t>
             </a:r>
           </a:p>
         </p:txBody>

</xml_diff>